<commit_message>
Upload new version of PPT slides
</commit_message>
<xml_diff>
--- a/reports/Machine Learning in Health Care Enforcement.pptx
+++ b/reports/Machine Learning in Health Care Enforcement.pptx
@@ -378,7 +378,7 @@
           <a:p>
             <a:fld id="{67B684D9-8E05-487B-B815-310A5C3A2A13}" type="datetimeFigureOut">
               <a:rPr lang="en-US" smtClean="0"/>
-              <a:t>2/28/2020</a:t>
+              <a:t>3/1/2020</a:t>
             </a:fld>
             <a:endParaRPr lang="en-US"/>
           </a:p>
@@ -640,7 +640,7 @@
           <a:p>
             <a:fld id="{67B684D9-8E05-487B-B815-310A5C3A2A13}" type="datetimeFigureOut">
               <a:rPr lang="en-US" smtClean="0"/>
-              <a:t>2/28/2020</a:t>
+              <a:t>3/1/2020</a:t>
             </a:fld>
             <a:endParaRPr lang="en-US"/>
           </a:p>
@@ -875,7 +875,7 @@
           <a:p>
             <a:fld id="{67B684D9-8E05-487B-B815-310A5C3A2A13}" type="datetimeFigureOut">
               <a:rPr lang="en-US" smtClean="0"/>
-              <a:t>2/28/2020</a:t>
+              <a:t>3/1/2020</a:t>
             </a:fld>
             <a:endParaRPr lang="en-US"/>
           </a:p>
@@ -1115,7 +1115,7 @@
           <a:p>
             <a:fld id="{67B684D9-8E05-487B-B815-310A5C3A2A13}" type="datetimeFigureOut">
               <a:rPr lang="en-US" smtClean="0"/>
-              <a:t>2/28/2020</a:t>
+              <a:t>3/1/2020</a:t>
             </a:fld>
             <a:endParaRPr lang="en-US"/>
           </a:p>
@@ -1422,7 +1422,7 @@
           <a:p>
             <a:fld id="{67B684D9-8E05-487B-B815-310A5C3A2A13}" type="datetimeFigureOut">
               <a:rPr lang="en-US" smtClean="0"/>
-              <a:t>2/28/2020</a:t>
+              <a:t>3/1/2020</a:t>
             </a:fld>
             <a:endParaRPr lang="en-US"/>
           </a:p>
@@ -1724,7 +1724,7 @@
           <a:p>
             <a:fld id="{67B684D9-8E05-487B-B815-310A5C3A2A13}" type="datetimeFigureOut">
               <a:rPr lang="en-US" smtClean="0"/>
-              <a:t>2/28/2020</a:t>
+              <a:t>3/1/2020</a:t>
             </a:fld>
             <a:endParaRPr lang="en-US"/>
           </a:p>
@@ -2146,7 +2146,7 @@
           <a:p>
             <a:fld id="{67B684D9-8E05-487B-B815-310A5C3A2A13}" type="datetimeFigureOut">
               <a:rPr lang="en-US" smtClean="0"/>
-              <a:t>2/28/2020</a:t>
+              <a:t>3/1/2020</a:t>
             </a:fld>
             <a:endParaRPr lang="en-US"/>
           </a:p>
@@ -2308,7 +2308,7 @@
           <a:p>
             <a:fld id="{67B684D9-8E05-487B-B815-310A5C3A2A13}" type="datetimeFigureOut">
               <a:rPr lang="en-US" smtClean="0"/>
-              <a:t>2/28/2020</a:t>
+              <a:t>3/1/2020</a:t>
             </a:fld>
             <a:endParaRPr lang="en-US"/>
           </a:p>
@@ -2403,7 +2403,7 @@
           <a:p>
             <a:fld id="{67B684D9-8E05-487B-B815-310A5C3A2A13}" type="datetimeFigureOut">
               <a:rPr lang="en-US" smtClean="0"/>
-              <a:t>2/28/2020</a:t>
+              <a:t>3/1/2020</a:t>
             </a:fld>
             <a:endParaRPr lang="en-US"/>
           </a:p>
@@ -2781,7 +2781,7 @@
           <a:p>
             <a:fld id="{67B684D9-8E05-487B-B815-310A5C3A2A13}" type="datetimeFigureOut">
               <a:rPr lang="en-US" smtClean="0"/>
-              <a:t>2/28/2020</a:t>
+              <a:t>3/1/2020</a:t>
             </a:fld>
             <a:endParaRPr lang="en-US"/>
           </a:p>
@@ -3070,7 +3070,7 @@
           <a:p>
             <a:fld id="{67B684D9-8E05-487B-B815-310A5C3A2A13}" type="datetimeFigureOut">
               <a:rPr lang="en-US" smtClean="0"/>
-              <a:t>2/28/2020</a:t>
+              <a:t>3/1/2020</a:t>
             </a:fld>
             <a:endParaRPr lang="en-US"/>
           </a:p>
@@ -3281,7 +3281,7 @@
           <a:p>
             <a:fld id="{67B684D9-8E05-487B-B815-310A5C3A2A13}" type="datetimeFigureOut">
               <a:rPr lang="en-US" smtClean="0"/>
-              <a:t>2/28/2020</a:t>
+              <a:t>3/1/2020</a:t>
             </a:fld>
             <a:endParaRPr lang="en-US"/>
           </a:p>
@@ -7598,7 +7598,7 @@
         <p:spPr/>
         <p:txBody>
           <a:bodyPr>
-            <a:normAutofit lnSpcReduction="10000"/>
+            <a:normAutofit fontScale="92500" lnSpcReduction="10000"/>
           </a:bodyPr>
           <a:lstStyle/>
           <a:p>
@@ -7609,9 +7609,25 @@
           </a:p>
           <a:p>
             <a:r>
-              <a:rPr lang="en-US" dirty="0"/>
-              <a:t>(link)</a:t>
-            </a:r>
+              <a:rPr lang="en-US" dirty="0">
+                <a:solidFill>
+                  <a:schemeClr val="accent6"/>
+                </a:solidFill>
+                <a:hlinkClick r:id="rId2">
+                  <a:extLst>
+                    <a:ext uri="{A12FA001-AC4F-418D-AE19-62706E023703}">
+                      <ahyp:hlinkClr xmlns:ahyp="http://schemas.microsoft.com/office/drawing/2018/hyperlinkcolor" val="tx"/>
+                    </a:ext>
+                  </a:extLst>
+                </a:hlinkClick>
+              </a:rPr>
+              <a:t>https://nbviewer.jupyter.org/github/JGreenLowe/HealthEnforcement/blob/master/models/lda.html</a:t>
+            </a:r>
+            <a:endParaRPr lang="en-US" dirty="0">
+              <a:solidFill>
+                <a:schemeClr val="accent6"/>
+              </a:solidFill>
+            </a:endParaRPr>
           </a:p>
           <a:p>
             <a:r>
@@ -7698,7 +7714,7 @@
           </p:nvPr>
         </p:nvPicPr>
         <p:blipFill>
-          <a:blip r:embed="rId2">
+          <a:blip r:embed="rId3">
             <a:extLst>
               <a:ext uri="{28A0092B-C50C-407E-A947-70E740481C1C}">
                 <a14:useLocalDpi xmlns:a14="http://schemas.microsoft.com/office/drawing/2010/main" val="0"/>

</xml_diff>